<commit_message>
Added some builder patterns
</commit_message>
<xml_diff>
--- a/docs/Milestone 2.pptx
+++ b/docs/Milestone 2.pptx
@@ -4899,7 +4899,7 @@
           <a:p>
             <a:r>
               <a:rPr lang="en-US" dirty="0"/>
-              <a:t>Tudor calin </a:t>
+              <a:t>Tudor-calin </a:t>
             </a:r>
             <a:r>
               <a:rPr lang="en-US" dirty="0" err="1"/>
@@ -4907,7 +4907,15 @@
             </a:r>
             <a:r>
               <a:rPr lang="en-US" dirty="0"/>
-              <a:t>, Stefan </a:t>
+              <a:t>,  </a:t>
+            </a:r>
+            <a:r>
+              <a:rPr lang="en-US" dirty="0" err="1"/>
+              <a:t>Stefan-Alexandru</a:t>
+            </a:r>
+            <a:r>
+              <a:rPr lang="en-US" dirty="0"/>
+              <a:t> </a:t>
             </a:r>
             <a:r>
               <a:rPr lang="en-US" dirty="0" err="1"/>
@@ -5101,23 +5109,17 @@
             </a:r>
             <a:r>
               <a:rPr lang="en-US" sz="4000" dirty="0"/>
-              <a:t> ( </a:t>
-            </a:r>
-            <a:r>
-              <a:rPr lang="en-US" sz="4000" dirty="0" err="1"/>
-              <a:t>ce</a:t>
-            </a:r>
+              <a:t> </a:t>
+            </a:r>
+          </a:p>
+          <a:p>
+            <a:pPr marL="742950" lvl="1" indent="-285750">
+              <a:buFont typeface="Arial" panose="020B0604020202020204" pitchFamily="34" charset="0"/>
+              <a:buChar char="•"/>
+            </a:pPr>
             <a:r>
               <a:rPr lang="en-US" sz="4000" dirty="0"/>
-              <a:t> </a:t>
-            </a:r>
-            <a:r>
-              <a:rPr lang="en-US" sz="4000" dirty="0" err="1"/>
-              <a:t>avem</a:t>
-            </a:r>
-            <a:r>
-              <a:rPr lang="en-US" sz="4000" dirty="0"/>
-              <a:t>: Abstract </a:t>
+              <a:t>Abstract </a:t>
             </a:r>
             <a:r>
               <a:rPr lang="en-US" sz="4000" dirty="0" err="1"/>
@@ -5125,7 +5127,7 @@
             </a:r>
             <a:r>
               <a:rPr lang="en-US" sz="4000" dirty="0"/>
-              <a:t> Introduction)</a:t>
+              <a:t> Introduction</a:t>
             </a:r>
           </a:p>
           <a:p>

</xml_diff>